<commit_message>
Changes modified in PPT.
</commit_message>
<xml_diff>
--- a/AMI1.pptx
+++ b/AMI1.pptx
@@ -227,7 +227,7 @@
           <a:p>
             <a:fld id="{C631A6F9-D464-4BB1-B7D0-87462F6A6D70}" type="datetimeFigureOut">
               <a:rPr lang="en-US" smtClean="0"/>
-              <a:t>8/6/2018</a:t>
+              <a:t>8/9/2018</a:t>
             </a:fld>
             <a:endParaRPr lang="en-US"/>
           </a:p>
@@ -396,7 +396,7 @@
           <a:p>
             <a:fld id="{1E96D1B4-6335-49CE-92CE-81115B655C07}" type="datetimeFigureOut">
               <a:rPr lang="en-US" smtClean="0"/>
-              <a:t>8/6/2018</a:t>
+              <a:t>8/9/2018</a:t>
             </a:fld>
             <a:endParaRPr lang="en-US"/>
           </a:p>
@@ -1227,7 +1227,7 @@
             <a:fld id="{A0ED982F-42D9-4144-B4C0-B15723CFE9C0}" type="datetimeFigureOut">
               <a:rPr lang="en-US" smtClean="0"/>
               <a:pPr/>
-              <a:t>8/6/2018</a:t>
+              <a:t>8/9/2018</a:t>
             </a:fld>
             <a:endParaRPr lang="en-US" dirty="0"/>
           </a:p>
@@ -1543,7 +1543,7 @@
           <a:p>
             <a:fld id="{A0ED982F-42D9-4144-B4C0-B15723CFE9C0}" type="datetimeFigureOut">
               <a:rPr lang="en-US" smtClean="0"/>
-              <a:t>8/6/2018</a:t>
+              <a:t>8/9/2018</a:t>
             </a:fld>
             <a:endParaRPr lang="en-US"/>
           </a:p>
@@ -1830,7 +1830,7 @@
           <a:p>
             <a:fld id="{A0ED982F-42D9-4144-B4C0-B15723CFE9C0}" type="datetimeFigureOut">
               <a:rPr lang="en-US" smtClean="0"/>
-              <a:t>8/6/2018</a:t>
+              <a:t>8/9/2018</a:t>
             </a:fld>
             <a:endParaRPr lang="en-US"/>
           </a:p>
@@ -2107,7 +2107,7 @@
           <a:p>
             <a:fld id="{A0ED982F-42D9-4144-B4C0-B15723CFE9C0}" type="datetimeFigureOut">
               <a:rPr lang="en-US" smtClean="0"/>
-              <a:t>8/6/2018</a:t>
+              <a:t>8/9/2018</a:t>
             </a:fld>
             <a:endParaRPr lang="en-US"/>
           </a:p>
@@ -2460,7 +2460,7 @@
           <a:p>
             <a:fld id="{A0ED982F-42D9-4144-B4C0-B15723CFE9C0}" type="datetimeFigureOut">
               <a:rPr lang="en-US" smtClean="0"/>
-              <a:t>8/6/2018</a:t>
+              <a:t>8/9/2018</a:t>
             </a:fld>
             <a:endParaRPr lang="en-US"/>
           </a:p>
@@ -2855,7 +2855,7 @@
           <a:p>
             <a:fld id="{A0ED982F-42D9-4144-B4C0-B15723CFE9C0}" type="datetimeFigureOut">
               <a:rPr lang="en-US" smtClean="0"/>
-              <a:t>8/6/2018</a:t>
+              <a:t>8/9/2018</a:t>
             </a:fld>
             <a:endParaRPr lang="en-US"/>
           </a:p>
@@ -3384,7 +3384,7 @@
           <a:p>
             <a:fld id="{A0ED982F-42D9-4144-B4C0-B15723CFE9C0}" type="datetimeFigureOut">
               <a:rPr lang="en-US" smtClean="0"/>
-              <a:t>8/6/2018</a:t>
+              <a:t>8/9/2018</a:t>
             </a:fld>
             <a:endParaRPr lang="en-US"/>
           </a:p>
@@ -3609,7 +3609,7 @@
           <a:p>
             <a:fld id="{A0ED982F-42D9-4144-B4C0-B15723CFE9C0}" type="datetimeFigureOut">
               <a:rPr lang="en-US" smtClean="0"/>
-              <a:t>8/6/2018</a:t>
+              <a:t>8/9/2018</a:t>
             </a:fld>
             <a:endParaRPr lang="en-US"/>
           </a:p>
@@ -3811,7 +3811,7 @@
           <a:p>
             <a:fld id="{A0ED982F-42D9-4144-B4C0-B15723CFE9C0}" type="datetimeFigureOut">
               <a:rPr lang="en-US" smtClean="0"/>
-              <a:t>8/6/2018</a:t>
+              <a:t>8/9/2018</a:t>
             </a:fld>
             <a:endParaRPr lang="en-US"/>
           </a:p>
@@ -4195,7 +4195,7 @@
           <a:p>
             <a:fld id="{A0ED982F-42D9-4144-B4C0-B15723CFE9C0}" type="datetimeFigureOut">
               <a:rPr lang="en-US" smtClean="0"/>
-              <a:t>8/6/2018</a:t>
+              <a:t>8/9/2018</a:t>
             </a:fld>
             <a:endParaRPr lang="en-US"/>
           </a:p>
@@ -4559,7 +4559,7 @@
           <a:p>
             <a:fld id="{A0ED982F-42D9-4144-B4C0-B15723CFE9C0}" type="datetimeFigureOut">
               <a:rPr lang="en-US" smtClean="0"/>
-              <a:t>8/6/2018</a:t>
+              <a:t>8/9/2018</a:t>
             </a:fld>
             <a:endParaRPr lang="en-US"/>
           </a:p>
@@ -4879,7 +4879,7 @@
           <a:p>
             <a:fld id="{A0ED982F-42D9-4144-B4C0-B15723CFE9C0}" type="datetimeFigureOut">
               <a:rPr lang="en-US" smtClean="0"/>
-              <a:t>8/6/2018</a:t>
+              <a:t>8/9/2018</a:t>
             </a:fld>
             <a:endParaRPr lang="en-US"/>
           </a:p>
@@ -5467,6 +5467,10 @@
           <a:bodyPr/>
           <a:lstStyle/>
           <a:p>
+            <a:r>
+              <a:rPr lang="en-IN" smtClean="0"/>
+              <a:t>Tortoise Git</a:t>
+            </a:r>
             <a:endParaRPr lang="en-US"/>
           </a:p>
         </p:txBody>

</xml_diff>